<commit_message>
First pass at a presentation.
</commit_message>
<xml_diff>
--- a/MicroORMs/MicroORMs - Keeping Your DBA Happy.pptx
+++ b/MicroORMs/MicroORMs - Keeping Your DBA Happy.pptx
@@ -5,11 +5,22 @@
     <p:sldMasterId id="2147483660" r:id="rId1"/>
   </p:sldMasterIdLst>
   <p:notesMasterIdLst>
-    <p:notesMasterId r:id="rId4"/>
+    <p:notesMasterId r:id="rId15"/>
   </p:notesMasterIdLst>
   <p:sldIdLst>
     <p:sldId id="256" r:id="rId2"/>
     <p:sldId id="257" r:id="rId3"/>
+    <p:sldId id="258" r:id="rId4"/>
+    <p:sldId id="259" r:id="rId5"/>
+    <p:sldId id="260" r:id="rId6"/>
+    <p:sldId id="261" r:id="rId7"/>
+    <p:sldId id="262" r:id="rId8"/>
+    <p:sldId id="263" r:id="rId9"/>
+    <p:sldId id="264" r:id="rId10"/>
+    <p:sldId id="265" r:id="rId11"/>
+    <p:sldId id="266" r:id="rId12"/>
+    <p:sldId id="267" r:id="rId13"/>
+    <p:sldId id="268" r:id="rId14"/>
   </p:sldIdLst>
   <p:sldSz cx="9144000" cy="6858000" type="screen4x3"/>
   <p:notesSz cx="6858000" cy="9144000"/>
@@ -193,7 +204,7 @@
           <a:p>
             <a:fld id="{55D1394E-9D0A-DA48-A6C2-F042F4126642}" type="datetimeFigureOut">
               <a:rPr lang="en-US" smtClean="0"/>
-              <a:t>9/25/12</a:t>
+              <a:t>10/3/2012</a:t>
             </a:fld>
             <a:endParaRPr lang="en-US"/>
           </a:p>
@@ -505,156 +516,6 @@
           <a:bodyPr/>
           <a:lstStyle/>
           <a:p>
-            <a:r>
-              <a:rPr lang="en-US" dirty="0" smtClean="0"/>
-              <a:t>Interesting Links:</a:t>
-            </a:r>
-          </a:p>
-          <a:p>
-            <a:r>
-              <a:rPr lang="en-US" dirty="0" smtClean="0"/>
-              <a:t>Ted </a:t>
-            </a:r>
-            <a:r>
-              <a:rPr lang="en-US" dirty="0" err="1" smtClean="0"/>
-              <a:t>Neward’s</a:t>
-            </a:r>
-            <a:r>
-              <a:rPr lang="en-US" dirty="0" smtClean="0"/>
-              <a:t> Vietnam - http://</a:t>
-            </a:r>
-            <a:r>
-              <a:rPr lang="en-US" dirty="0" err="1" smtClean="0"/>
-              <a:t>blogs.tedneward.com</a:t>
-            </a:r>
-            <a:r>
-              <a:rPr lang="en-US" dirty="0" smtClean="0"/>
-              <a:t>/2006/06/26/</a:t>
-            </a:r>
-            <a:r>
-              <a:rPr lang="en-US" dirty="0" err="1" smtClean="0"/>
-              <a:t>The+Vietnam+Of+Computer+Science.aspx</a:t>
-            </a:r>
-            <a:endParaRPr lang="en-US" dirty="0" smtClean="0"/>
-          </a:p>
-          <a:p>
-            <a:r>
-              <a:rPr lang="en-US" dirty="0" smtClean="0"/>
-              <a:t>O/R Impedance Mismatch - http://</a:t>
-            </a:r>
-            <a:r>
-              <a:rPr lang="en-US" dirty="0" err="1" smtClean="0"/>
-              <a:t>en.wikipedia.org</a:t>
-            </a:r>
-            <a:r>
-              <a:rPr lang="en-US" dirty="0" smtClean="0"/>
-              <a:t>/wiki/Object-</a:t>
-            </a:r>
-            <a:r>
-              <a:rPr lang="en-US" dirty="0" err="1" smtClean="0"/>
-              <a:t>Relational_impedance_mismatch</a:t>
-            </a:r>
-            <a:endParaRPr lang="en-US" dirty="0" smtClean="0"/>
-          </a:p>
-          <a:p>
-            <a:r>
-              <a:rPr lang="en-US" dirty="0" smtClean="0"/>
-              <a:t>When and why (</a:t>
-            </a:r>
-            <a:r>
-              <a:rPr lang="en-US" dirty="0" err="1" smtClean="0"/>
-              <a:t>Rotem</a:t>
-            </a:r>
-            <a:r>
-              <a:rPr lang="en-US" dirty="0" smtClean="0"/>
-              <a:t>-Gal-Oz)</a:t>
-            </a:r>
-            <a:r>
-              <a:rPr lang="en-US" baseline="0" dirty="0" smtClean="0"/>
-              <a:t> - http://</a:t>
-            </a:r>
-            <a:r>
-              <a:rPr lang="en-US" baseline="0" dirty="0" err="1" smtClean="0"/>
-              <a:t>www.rgoarchitects.com</a:t>
-            </a:r>
-            <a:r>
-              <a:rPr lang="en-US" baseline="0" dirty="0" smtClean="0"/>
-              <a:t>/Files/</a:t>
-            </a:r>
-            <a:r>
-              <a:rPr lang="en-US" baseline="0" dirty="0" err="1" smtClean="0"/>
-              <a:t>ormappin.pdf</a:t>
-            </a:r>
-            <a:endParaRPr lang="en-US" baseline="0" dirty="0" smtClean="0"/>
-          </a:p>
-          <a:p>
-            <a:r>
-              <a:rPr lang="en-US" baseline="0" dirty="0" err="1" smtClean="0"/>
-              <a:t>Orm</a:t>
-            </a:r>
-            <a:r>
-              <a:rPr lang="en-US" baseline="0" dirty="0" smtClean="0"/>
-              <a:t> Hate (Fowler) - http://</a:t>
-            </a:r>
-            <a:r>
-              <a:rPr lang="en-US" baseline="0" dirty="0" err="1" smtClean="0"/>
-              <a:t>martinfowler.com</a:t>
-            </a:r>
-            <a:r>
-              <a:rPr lang="en-US" baseline="0" dirty="0" smtClean="0"/>
-              <a:t>/</a:t>
-            </a:r>
-            <a:r>
-              <a:rPr lang="en-US" baseline="0" dirty="0" err="1" smtClean="0"/>
-              <a:t>bliki</a:t>
-            </a:r>
-            <a:r>
-              <a:rPr lang="en-US" baseline="0" dirty="0" smtClean="0"/>
-              <a:t>/</a:t>
-            </a:r>
-            <a:r>
-              <a:rPr lang="en-US" baseline="0" dirty="0" err="1" smtClean="0"/>
-              <a:t>OrmHate.html</a:t>
-            </a:r>
-            <a:endParaRPr lang="en-US" baseline="0" dirty="0" smtClean="0"/>
-          </a:p>
-          <a:p>
-            <a:r>
-              <a:rPr lang="en-US" dirty="0" smtClean="0"/>
-              <a:t>Choosing an ORM (</a:t>
-            </a:r>
-            <a:r>
-              <a:rPr lang="en-US" dirty="0" err="1" smtClean="0"/>
-              <a:t>Bogard</a:t>
-            </a:r>
-            <a:r>
-              <a:rPr lang="en-US" dirty="0" smtClean="0"/>
-              <a:t>) - http://</a:t>
-            </a:r>
-            <a:r>
-              <a:rPr lang="en-US" dirty="0" err="1" smtClean="0"/>
-              <a:t>lostechies.com</a:t>
-            </a:r>
-            <a:r>
-              <a:rPr lang="en-US" dirty="0" smtClean="0"/>
-              <a:t>/</a:t>
-            </a:r>
-            <a:r>
-              <a:rPr lang="en-US" dirty="0" err="1" smtClean="0"/>
-              <a:t>jimmybogard</a:t>
-            </a:r>
-            <a:r>
-              <a:rPr lang="en-US" dirty="0" smtClean="0"/>
-              <a:t>/2012/07/20/choosing-an-</a:t>
-            </a:r>
-            <a:r>
-              <a:rPr lang="en-US" dirty="0" err="1" smtClean="0"/>
-              <a:t>orm</a:t>
-            </a:r>
-            <a:r>
-              <a:rPr lang="en-US" smtClean="0"/>
-              <a:t>-strategy/</a:t>
-            </a:r>
             <a:endParaRPr lang="en-US" dirty="0"/>
           </a:p>
         </p:txBody>
@@ -930,7 +791,7 @@
           <a:p>
             <a:fld id="{D140825E-4A15-4D39-8176-1F07E904CB30}" type="datetimeFigureOut">
               <a:rPr lang="en-US" smtClean="0"/>
-              <a:t>9/25/12</a:t>
+              <a:t>10/3/2012</a:t>
             </a:fld>
             <a:endParaRPr lang="en-US"/>
           </a:p>
@@ -1021,7 +882,7 @@
           <a:p>
             <a:fld id="{D140825E-4A15-4D39-8176-1F07E904CB30}" type="datetimeFigureOut">
               <a:rPr lang="en-US" smtClean="0"/>
-              <a:t>9/25/12</a:t>
+              <a:t>10/3/2012</a:t>
             </a:fld>
             <a:endParaRPr lang="en-US"/>
           </a:p>
@@ -1324,7 +1185,7 @@
           <a:p>
             <a:fld id="{D140825E-4A15-4D39-8176-1F07E904CB30}" type="datetimeFigureOut">
               <a:rPr lang="en-US" smtClean="0"/>
-              <a:t>9/25/12</a:t>
+              <a:t>10/3/2012</a:t>
             </a:fld>
             <a:endParaRPr lang="en-US"/>
           </a:p>
@@ -1545,7 +1406,7 @@
           <a:p>
             <a:fld id="{D140825E-4A15-4D39-8176-1F07E904CB30}" type="datetimeFigureOut">
               <a:rPr lang="en-US" smtClean="0"/>
-              <a:t>9/25/12</a:t>
+              <a:t>10/3/2012</a:t>
             </a:fld>
             <a:endParaRPr lang="en-US"/>
           </a:p>
@@ -1933,7 +1794,7 @@
           <a:p>
             <a:fld id="{D140825E-4A15-4D39-8176-1F07E904CB30}" type="datetimeFigureOut">
               <a:rPr lang="en-US" smtClean="0"/>
-              <a:t>9/25/12</a:t>
+              <a:t>10/3/2012</a:t>
             </a:fld>
             <a:endParaRPr lang="en-US"/>
           </a:p>
@@ -2241,7 +2102,7 @@
           <a:p>
             <a:fld id="{D140825E-4A15-4D39-8176-1F07E904CB30}" type="datetimeFigureOut">
               <a:rPr lang="en-US" smtClean="0"/>
-              <a:t>9/25/12</a:t>
+              <a:t>10/3/2012</a:t>
             </a:fld>
             <a:endParaRPr lang="en-US"/>
           </a:p>
@@ -2439,7 +2300,7 @@
           <a:p>
             <a:fld id="{D140825E-4A15-4D39-8176-1F07E904CB30}" type="datetimeFigureOut">
               <a:rPr lang="en-US" smtClean="0"/>
-              <a:t>9/25/12</a:t>
+              <a:t>10/3/2012</a:t>
             </a:fld>
             <a:endParaRPr lang="en-US"/>
           </a:p>
@@ -2642,7 +2503,7 @@
           <a:p>
             <a:fld id="{D140825E-4A15-4D39-8176-1F07E904CB30}" type="datetimeFigureOut">
               <a:rPr lang="en-US" smtClean="0"/>
-              <a:t>9/25/12</a:t>
+              <a:t>10/3/2012</a:t>
             </a:fld>
             <a:endParaRPr lang="en-US"/>
           </a:p>
@@ -2835,7 +2696,7 @@
           <a:p>
             <a:fld id="{D140825E-4A15-4D39-8176-1F07E904CB30}" type="datetimeFigureOut">
               <a:rPr lang="en-US" smtClean="0"/>
-              <a:t>9/25/12</a:t>
+              <a:t>10/3/2012</a:t>
             </a:fld>
             <a:endParaRPr lang="en-US"/>
           </a:p>
@@ -3107,7 +2968,7 @@
           <a:p>
             <a:fld id="{D140825E-4A15-4D39-8176-1F07E904CB30}" type="datetimeFigureOut">
               <a:rPr lang="en-US" smtClean="0"/>
-              <a:t>9/25/12</a:t>
+              <a:t>10/3/2012</a:t>
             </a:fld>
             <a:endParaRPr lang="en-US"/>
           </a:p>
@@ -3418,7 +3279,7 @@
           <a:p>
             <a:fld id="{D140825E-4A15-4D39-8176-1F07E904CB30}" type="datetimeFigureOut">
               <a:rPr lang="en-US" smtClean="0"/>
-              <a:t>9/25/12</a:t>
+              <a:t>10/3/2012</a:t>
             </a:fld>
             <a:endParaRPr lang="en-US"/>
           </a:p>
@@ -3884,7 +3745,7 @@
           <a:p>
             <a:fld id="{D140825E-4A15-4D39-8176-1F07E904CB30}" type="datetimeFigureOut">
               <a:rPr lang="en-US" smtClean="0"/>
-              <a:t>9/25/12</a:t>
+              <a:t>10/3/2012</a:t>
             </a:fld>
             <a:endParaRPr lang="en-US"/>
           </a:p>
@@ -4248,7 +4109,7 @@
           <a:p>
             <a:fld id="{D140825E-4A15-4D39-8176-1F07E904CB30}" type="datetimeFigureOut">
               <a:rPr lang="en-US" smtClean="0"/>
-              <a:t>9/25/12</a:t>
+              <a:t>10/3/2012</a:t>
             </a:fld>
             <a:endParaRPr lang="en-US"/>
           </a:p>
@@ -4559,7 +4420,7 @@
           <a:p>
             <a:fld id="{D140825E-4A15-4D39-8176-1F07E904CB30}" type="datetimeFigureOut">
               <a:rPr lang="en-US" smtClean="0"/>
-              <a:t>9/25/12</a:t>
+              <a:t>10/3/2012</a:t>
             </a:fld>
             <a:endParaRPr lang="en-US"/>
           </a:p>
@@ -4870,7 +4731,7 @@
           <a:p>
             <a:fld id="{D140825E-4A15-4D39-8176-1F07E904CB30}" type="datetimeFigureOut">
               <a:rPr lang="en-US" smtClean="0"/>
-              <a:t>9/25/12</a:t>
+              <a:t>10/3/2012</a:t>
             </a:fld>
             <a:endParaRPr lang="en-US"/>
           </a:p>
@@ -5355,7 +5216,7 @@
           <a:p>
             <a:fld id="{D140825E-4A15-4D39-8176-1F07E904CB30}" type="datetimeFigureOut">
               <a:rPr lang="en-US" smtClean="0"/>
-              <a:t>9/25/12</a:t>
+              <a:t>10/3/2012</a:t>
             </a:fld>
             <a:endParaRPr lang="en-US"/>
           </a:p>
@@ -5618,7 +5479,7 @@
           <a:p>
             <a:fld id="{D140825E-4A15-4D39-8176-1F07E904CB30}" type="datetimeFigureOut">
               <a:rPr lang="en-US" smtClean="0"/>
-              <a:t>9/25/12</a:t>
+              <a:t>10/3/2012</a:t>
             </a:fld>
             <a:endParaRPr lang="en-US"/>
           </a:p>
@@ -6052,6 +5913,404 @@
 </p:sld>
 </file>
 
+<file path=ppt/slides/slide10.xml><?xml version="1.0" encoding="utf-8"?>
+<p:sld xmlns:a="http://schemas.openxmlformats.org/drawingml/2006/main" xmlns:r="http://schemas.openxmlformats.org/officeDocument/2006/relationships" xmlns:p="http://schemas.openxmlformats.org/presentationml/2006/main">
+  <p:cSld>
+    <p:spTree>
+      <p:nvGrpSpPr>
+        <p:cNvPr id="1" name=""/>
+        <p:cNvGrpSpPr/>
+        <p:nvPr/>
+      </p:nvGrpSpPr>
+      <p:grpSpPr>
+        <a:xfrm>
+          <a:off x="0" y="0"/>
+          <a:ext cx="0" cy="0"/>
+          <a:chOff x="0" y="0"/>
+          <a:chExt cx="0" cy="0"/>
+        </a:xfrm>
+      </p:grpSpPr>
+      <p:sp>
+        <p:nvSpPr>
+          <p:cNvPr id="2" name="Title 1"/>
+          <p:cNvSpPr>
+            <a:spLocks noGrp="1"/>
+          </p:cNvSpPr>
+          <p:nvPr>
+            <p:ph type="title"/>
+          </p:nvPr>
+        </p:nvSpPr>
+        <p:spPr/>
+        <p:txBody>
+          <a:bodyPr/>
+          <a:lstStyle/>
+          <a:p>
+            <a:r>
+              <a:rPr lang="en-US" dirty="0" err="1" smtClean="0"/>
+              <a:t>PetaPoco</a:t>
+            </a:r>
+            <a:endParaRPr lang="en-US" dirty="0"/>
+          </a:p>
+        </p:txBody>
+      </p:sp>
+      <p:sp>
+        <p:nvSpPr>
+          <p:cNvPr id="3" name="Content Placeholder 2"/>
+          <p:cNvSpPr>
+            <a:spLocks noGrp="1"/>
+          </p:cNvSpPr>
+          <p:nvPr>
+            <p:ph idx="1"/>
+          </p:nvPr>
+        </p:nvSpPr>
+        <p:spPr>
+          <a:xfrm>
+            <a:off x="779463" y="3067664"/>
+            <a:ext cx="7583487" cy="722671"/>
+          </a:xfrm>
+        </p:spPr>
+        <p:txBody>
+          <a:bodyPr/>
+          <a:lstStyle/>
+          <a:p>
+            <a:pPr marL="0" indent="0" algn="ctr">
+              <a:buNone/>
+            </a:pPr>
+            <a:r>
+              <a:rPr lang="en-US" sz="2800" dirty="0" smtClean="0"/>
+              <a:t>DEMO – Object to Table Mapping</a:t>
+            </a:r>
+            <a:endParaRPr lang="en-US" sz="2800" dirty="0"/>
+          </a:p>
+        </p:txBody>
+      </p:sp>
+    </p:spTree>
+    <p:extLst>
+      <p:ext uri="{BB962C8B-B14F-4D97-AF65-F5344CB8AC3E}">
+        <p14:creationId xmlns:p14="http://schemas.microsoft.com/office/powerpoint/2010/main" val="2112742969"/>
+      </p:ext>
+    </p:extLst>
+  </p:cSld>
+  <p:clrMapOvr>
+    <a:masterClrMapping/>
+  </p:clrMapOvr>
+</p:sld>
+</file>
+
+<file path=ppt/slides/slide11.xml><?xml version="1.0" encoding="utf-8"?>
+<p:sld xmlns:a="http://schemas.openxmlformats.org/drawingml/2006/main" xmlns:r="http://schemas.openxmlformats.org/officeDocument/2006/relationships" xmlns:p="http://schemas.openxmlformats.org/presentationml/2006/main">
+  <p:cSld>
+    <p:spTree>
+      <p:nvGrpSpPr>
+        <p:cNvPr id="1" name=""/>
+        <p:cNvGrpSpPr/>
+        <p:nvPr/>
+      </p:nvGrpSpPr>
+      <p:grpSpPr>
+        <a:xfrm>
+          <a:off x="0" y="0"/>
+          <a:ext cx="0" cy="0"/>
+          <a:chOff x="0" y="0"/>
+          <a:chExt cx="0" cy="0"/>
+        </a:xfrm>
+      </p:grpSpPr>
+      <p:sp>
+        <p:nvSpPr>
+          <p:cNvPr id="2" name="Title 1"/>
+          <p:cNvSpPr>
+            <a:spLocks noGrp="1"/>
+          </p:cNvSpPr>
+          <p:nvPr>
+            <p:ph type="title"/>
+          </p:nvPr>
+        </p:nvSpPr>
+        <p:spPr/>
+        <p:txBody>
+          <a:bodyPr/>
+          <a:lstStyle/>
+          <a:p>
+            <a:r>
+              <a:rPr lang="en-US" dirty="0" err="1" smtClean="0"/>
+              <a:t>PetaPoco</a:t>
+            </a:r>
+            <a:endParaRPr lang="en-US" dirty="0"/>
+          </a:p>
+        </p:txBody>
+      </p:sp>
+      <p:sp>
+        <p:nvSpPr>
+          <p:cNvPr id="3" name="Content Placeholder 2"/>
+          <p:cNvSpPr>
+            <a:spLocks noGrp="1"/>
+          </p:cNvSpPr>
+          <p:nvPr>
+            <p:ph idx="1"/>
+          </p:nvPr>
+        </p:nvSpPr>
+        <p:spPr>
+          <a:xfrm>
+            <a:off x="779463" y="3067664"/>
+            <a:ext cx="7583487" cy="722671"/>
+          </a:xfrm>
+        </p:spPr>
+        <p:txBody>
+          <a:bodyPr/>
+          <a:lstStyle/>
+          <a:p>
+            <a:pPr marL="0" indent="0" algn="ctr">
+              <a:buNone/>
+            </a:pPr>
+            <a:r>
+              <a:rPr lang="en-US" sz="2800" dirty="0" smtClean="0"/>
+              <a:t>DEMO – Create, Update, Delete</a:t>
+            </a:r>
+            <a:endParaRPr lang="en-US" sz="2800" dirty="0"/>
+          </a:p>
+        </p:txBody>
+      </p:sp>
+    </p:spTree>
+    <p:extLst>
+      <p:ext uri="{BB962C8B-B14F-4D97-AF65-F5344CB8AC3E}">
+        <p14:creationId xmlns:p14="http://schemas.microsoft.com/office/powerpoint/2010/main" val="3572151222"/>
+      </p:ext>
+    </p:extLst>
+  </p:cSld>
+  <p:clrMapOvr>
+    <a:masterClrMapping/>
+  </p:clrMapOvr>
+</p:sld>
+</file>
+
+<file path=ppt/slides/slide12.xml><?xml version="1.0" encoding="utf-8"?>
+<p:sld xmlns:a="http://schemas.openxmlformats.org/drawingml/2006/main" xmlns:r="http://schemas.openxmlformats.org/officeDocument/2006/relationships" xmlns:p="http://schemas.openxmlformats.org/presentationml/2006/main">
+  <p:cSld>
+    <p:spTree>
+      <p:nvGrpSpPr>
+        <p:cNvPr id="1" name=""/>
+        <p:cNvGrpSpPr/>
+        <p:nvPr/>
+      </p:nvGrpSpPr>
+      <p:grpSpPr>
+        <a:xfrm>
+          <a:off x="0" y="0"/>
+          <a:ext cx="0" cy="0"/>
+          <a:chOff x="0" y="0"/>
+          <a:chExt cx="0" cy="0"/>
+        </a:xfrm>
+      </p:grpSpPr>
+      <p:sp>
+        <p:nvSpPr>
+          <p:cNvPr id="2" name="Title 1"/>
+          <p:cNvSpPr>
+            <a:spLocks noGrp="1"/>
+          </p:cNvSpPr>
+          <p:nvPr>
+            <p:ph type="title"/>
+          </p:nvPr>
+        </p:nvSpPr>
+        <p:spPr/>
+        <p:txBody>
+          <a:bodyPr/>
+          <a:lstStyle/>
+          <a:p>
+            <a:r>
+              <a:rPr lang="en-US" dirty="0" smtClean="0"/>
+              <a:t>Summary</a:t>
+            </a:r>
+            <a:endParaRPr lang="en-US" dirty="0"/>
+          </a:p>
+        </p:txBody>
+      </p:sp>
+      <p:sp>
+        <p:nvSpPr>
+          <p:cNvPr id="3" name="Content Placeholder 2"/>
+          <p:cNvSpPr>
+            <a:spLocks noGrp="1"/>
+          </p:cNvSpPr>
+          <p:nvPr>
+            <p:ph idx="1"/>
+          </p:nvPr>
+        </p:nvSpPr>
+        <p:spPr/>
+        <p:txBody>
+          <a:bodyPr/>
+          <a:lstStyle/>
+          <a:p>
+            <a:r>
+              <a:rPr lang="en-US" sz="2800" dirty="0" smtClean="0"/>
+              <a:t>Don’t write your own data access layer</a:t>
+            </a:r>
+          </a:p>
+          <a:p>
+            <a:endParaRPr lang="en-US" sz="2800" dirty="0" smtClean="0"/>
+          </a:p>
+          <a:p>
+            <a:r>
+              <a:rPr lang="en-US" sz="2800" dirty="0" smtClean="0"/>
+              <a:t>Use the right tool for your situation</a:t>
+            </a:r>
+          </a:p>
+          <a:p>
+            <a:pPr lvl="1"/>
+            <a:r>
+              <a:rPr lang="en-US" sz="2400" i="1" dirty="0" smtClean="0"/>
+              <a:t>None of these solutions are “one-size fits all”</a:t>
+            </a:r>
+          </a:p>
+          <a:p>
+            <a:endParaRPr lang="en-US" sz="2800" dirty="0" smtClean="0"/>
+          </a:p>
+          <a:p>
+            <a:r>
+              <a:rPr lang="en-US" sz="2800" dirty="0" err="1" smtClean="0"/>
+              <a:t>PetaPoco</a:t>
+            </a:r>
+            <a:r>
+              <a:rPr lang="en-US" sz="2800" dirty="0" smtClean="0"/>
+              <a:t> is a solid, light-weight data access layer</a:t>
+            </a:r>
+            <a:endParaRPr lang="en-US" sz="2800" dirty="0"/>
+          </a:p>
+        </p:txBody>
+      </p:sp>
+    </p:spTree>
+    <p:extLst>
+      <p:ext uri="{BB962C8B-B14F-4D97-AF65-F5344CB8AC3E}">
+        <p14:creationId xmlns:p14="http://schemas.microsoft.com/office/powerpoint/2010/main" val="3563571819"/>
+      </p:ext>
+    </p:extLst>
+  </p:cSld>
+  <p:clrMapOvr>
+    <a:masterClrMapping/>
+  </p:clrMapOvr>
+</p:sld>
+</file>
+
+<file path=ppt/slides/slide13.xml><?xml version="1.0" encoding="utf-8"?>
+<p:sld xmlns:a="http://schemas.openxmlformats.org/drawingml/2006/main" xmlns:r="http://schemas.openxmlformats.org/officeDocument/2006/relationships" xmlns:p="http://schemas.openxmlformats.org/presentationml/2006/main">
+  <p:cSld>
+    <p:spTree>
+      <p:nvGrpSpPr>
+        <p:cNvPr id="1" name=""/>
+        <p:cNvGrpSpPr/>
+        <p:nvPr/>
+      </p:nvGrpSpPr>
+      <p:grpSpPr>
+        <a:xfrm>
+          <a:off x="0" y="0"/>
+          <a:ext cx="0" cy="0"/>
+          <a:chOff x="0" y="0"/>
+          <a:chExt cx="0" cy="0"/>
+        </a:xfrm>
+      </p:grpSpPr>
+      <p:sp>
+        <p:nvSpPr>
+          <p:cNvPr id="2" name="Title 1"/>
+          <p:cNvSpPr>
+            <a:spLocks noGrp="1"/>
+          </p:cNvSpPr>
+          <p:nvPr>
+            <p:ph type="title"/>
+          </p:nvPr>
+        </p:nvSpPr>
+        <p:spPr>
+          <a:xfrm>
+            <a:off x="779463" y="646471"/>
+            <a:ext cx="7583487" cy="1044388"/>
+          </a:xfrm>
+        </p:spPr>
+        <p:txBody>
+          <a:bodyPr/>
+          <a:lstStyle/>
+          <a:p>
+            <a:r>
+              <a:rPr lang="en-US" sz="7200" dirty="0" smtClean="0"/>
+              <a:t>Thank You!</a:t>
+            </a:r>
+            <a:endParaRPr lang="en-US" sz="7200" dirty="0"/>
+          </a:p>
+        </p:txBody>
+      </p:sp>
+      <p:sp>
+        <p:nvSpPr>
+          <p:cNvPr id="3" name="Content Placeholder 2"/>
+          <p:cNvSpPr>
+            <a:spLocks noGrp="1"/>
+          </p:cNvSpPr>
+          <p:nvPr>
+            <p:ph idx="1"/>
+          </p:nvPr>
+        </p:nvSpPr>
+        <p:spPr/>
+        <p:txBody>
+          <a:bodyPr>
+            <a:normAutofit/>
+          </a:bodyPr>
+          <a:lstStyle/>
+          <a:p>
+            <a:pPr marL="0" indent="0" algn="ctr">
+              <a:buNone/>
+            </a:pPr>
+            <a:endParaRPr lang="en-US" sz="4800" dirty="0" smtClean="0">
+              <a:hlinkClick r:id="rId2"/>
+            </a:endParaRPr>
+          </a:p>
+          <a:p>
+            <a:pPr marL="0" indent="0" algn="ctr">
+              <a:buNone/>
+            </a:pPr>
+            <a:r>
+              <a:rPr lang="en-US" sz="4400" dirty="0" smtClean="0">
+                <a:hlinkClick r:id="rId2"/>
+              </a:rPr>
+              <a:t>ekepes@gmail.com</a:t>
+            </a:r>
+            <a:endParaRPr lang="en-US" sz="4400" dirty="0" smtClean="0"/>
+          </a:p>
+          <a:p>
+            <a:pPr marL="0" indent="0" algn="ctr">
+              <a:buNone/>
+            </a:pPr>
+            <a:r>
+              <a:rPr lang="en-US" sz="4400" dirty="0" smtClean="0"/>
+              <a:t>@</a:t>
+            </a:r>
+            <a:r>
+              <a:rPr lang="en-US" sz="4400" dirty="0" err="1" smtClean="0"/>
+              <a:t>ekepes</a:t>
+            </a:r>
+            <a:endParaRPr lang="en-US" sz="4400" dirty="0" smtClean="0"/>
+          </a:p>
+          <a:p>
+            <a:pPr marL="0" indent="0" algn="ctr">
+              <a:buNone/>
+            </a:pPr>
+            <a:r>
+              <a:rPr lang="en-US" sz="4400" dirty="0" smtClean="0">
+                <a:hlinkClick r:id="rId3"/>
+              </a:rPr>
+              <a:t>https://github.com/ekepes</a:t>
+            </a:r>
+            <a:endParaRPr lang="en-US" sz="4400" dirty="0" smtClean="0"/>
+          </a:p>
+          <a:p>
+            <a:endParaRPr lang="en-US" dirty="0"/>
+          </a:p>
+        </p:txBody>
+      </p:sp>
+    </p:spTree>
+    <p:extLst>
+      <p:ext uri="{BB962C8B-B14F-4D97-AF65-F5344CB8AC3E}">
+        <p14:creationId xmlns:p14="http://schemas.microsoft.com/office/powerpoint/2010/main" val="3126808049"/>
+      </p:ext>
+    </p:extLst>
+  </p:cSld>
+  <p:clrMapOvr>
+    <a:masterClrMapping/>
+  </p:clrMapOvr>
+</p:sld>
+</file>
+
 <file path=ppt/slides/slide2.xml><?xml version="1.0" encoding="utf-8"?>
 <p:sld xmlns:a="http://schemas.openxmlformats.org/drawingml/2006/main" xmlns:r="http://schemas.openxmlformats.org/officeDocument/2006/relationships" xmlns:p="http://schemas.openxmlformats.org/presentationml/2006/main">
   <p:cSld>
@@ -6104,14 +6363,56 @@
         </p:nvSpPr>
         <p:spPr/>
         <p:txBody>
-          <a:bodyPr/>
-          <a:lstStyle/>
-          <a:p>
-            <a:r>
-              <a:rPr lang="en-US" dirty="0" smtClean="0"/>
-              <a:t>What’s good for objects often isn’t good for tables</a:t>
-            </a:r>
-            <a:endParaRPr lang="en-US" dirty="0"/>
+          <a:bodyPr>
+            <a:normAutofit/>
+          </a:bodyPr>
+          <a:lstStyle/>
+          <a:p>
+            <a:pPr marL="0" indent="0" algn="ctr">
+              <a:buNone/>
+            </a:pPr>
+            <a:endParaRPr lang="en-US" sz="2800" dirty="0" smtClean="0"/>
+          </a:p>
+          <a:p>
+            <a:pPr marL="0" indent="0" algn="ctr">
+              <a:buNone/>
+            </a:pPr>
+            <a:endParaRPr lang="en-US" sz="2800" dirty="0"/>
+          </a:p>
+          <a:p>
+            <a:pPr marL="0" indent="0" algn="ctr">
+              <a:buNone/>
+            </a:pPr>
+            <a:r>
+              <a:rPr lang="en-US" sz="2800" dirty="0" smtClean="0"/>
+              <a:t>What’s </a:t>
+            </a:r>
+            <a:r>
+              <a:rPr lang="en-US" sz="2800" dirty="0" smtClean="0"/>
+              <a:t>good for objects often isn’t good for </a:t>
+            </a:r>
+            <a:r>
+              <a:rPr lang="en-US" sz="2800" dirty="0" smtClean="0"/>
+              <a:t>tables…</a:t>
+            </a:r>
+          </a:p>
+          <a:p>
+            <a:pPr marL="0" indent="0" algn="ctr">
+              <a:buNone/>
+            </a:pPr>
+            <a:r>
+              <a:rPr lang="en-US" sz="2800" dirty="0" smtClean="0"/>
+              <a:t>…</a:t>
+            </a:r>
+            <a:r>
+              <a:rPr lang="en-US" sz="2800" dirty="0"/>
+              <a:t>a</a:t>
+            </a:r>
+            <a:r>
+              <a:rPr lang="en-US" sz="2800" dirty="0" smtClean="0"/>
+              <a:t>nd vice versa</a:t>
+            </a:r>
+            <a:endParaRPr lang="en-US" sz="2800" dirty="0"/>
           </a:p>
         </p:txBody>
       </p:sp>
@@ -6119,6 +6420,769 @@
     <p:extLst>
       <p:ext uri="{BB962C8B-B14F-4D97-AF65-F5344CB8AC3E}">
         <p14:creationId xmlns:p14="http://schemas.microsoft.com/office/powerpoint/2010/main" val="2437998508"/>
+      </p:ext>
+    </p:extLst>
+  </p:cSld>
+  <p:clrMapOvr>
+    <a:masterClrMapping/>
+  </p:clrMapOvr>
+</p:sld>
+</file>
+
+<file path=ppt/slides/slide3.xml><?xml version="1.0" encoding="utf-8"?>
+<p:sld xmlns:a="http://schemas.openxmlformats.org/drawingml/2006/main" xmlns:r="http://schemas.openxmlformats.org/officeDocument/2006/relationships" xmlns:p="http://schemas.openxmlformats.org/presentationml/2006/main">
+  <p:cSld>
+    <p:spTree>
+      <p:nvGrpSpPr>
+        <p:cNvPr id="1" name=""/>
+        <p:cNvGrpSpPr/>
+        <p:nvPr/>
+      </p:nvGrpSpPr>
+      <p:grpSpPr>
+        <a:xfrm>
+          <a:off x="0" y="0"/>
+          <a:ext cx="0" cy="0"/>
+          <a:chOff x="0" y="0"/>
+          <a:chExt cx="0" cy="0"/>
+        </a:xfrm>
+      </p:grpSpPr>
+      <p:sp>
+        <p:nvSpPr>
+          <p:cNvPr id="2" name="Title 1"/>
+          <p:cNvSpPr>
+            <a:spLocks noGrp="1"/>
+          </p:cNvSpPr>
+          <p:nvPr>
+            <p:ph type="title"/>
+          </p:nvPr>
+        </p:nvSpPr>
+        <p:spPr>
+          <a:xfrm>
+            <a:off x="676224" y="2906806"/>
+            <a:ext cx="7583487" cy="1044388"/>
+          </a:xfrm>
+        </p:spPr>
+        <p:txBody>
+          <a:bodyPr/>
+          <a:lstStyle/>
+          <a:p>
+            <a:pPr algn="ctr"/>
+            <a:r>
+              <a:rPr lang="en-US" dirty="0" smtClean="0"/>
+              <a:t>Object-Relational Impedance Mismatch</a:t>
+            </a:r>
+            <a:endParaRPr lang="en-US" dirty="0"/>
+          </a:p>
+        </p:txBody>
+      </p:sp>
+    </p:spTree>
+    <p:extLst>
+      <p:ext uri="{BB962C8B-B14F-4D97-AF65-F5344CB8AC3E}">
+        <p14:creationId xmlns:p14="http://schemas.microsoft.com/office/powerpoint/2010/main" val="2178669951"/>
+      </p:ext>
+    </p:extLst>
+  </p:cSld>
+  <p:clrMapOvr>
+    <a:masterClrMapping/>
+  </p:clrMapOvr>
+</p:sld>
+</file>
+
+<file path=ppt/slides/slide4.xml><?xml version="1.0" encoding="utf-8"?>
+<p:sld xmlns:a="http://schemas.openxmlformats.org/drawingml/2006/main" xmlns:r="http://schemas.openxmlformats.org/officeDocument/2006/relationships" xmlns:p="http://schemas.openxmlformats.org/presentationml/2006/main">
+  <p:cSld>
+    <p:spTree>
+      <p:nvGrpSpPr>
+        <p:cNvPr id="1" name=""/>
+        <p:cNvGrpSpPr/>
+        <p:nvPr/>
+      </p:nvGrpSpPr>
+      <p:grpSpPr>
+        <a:xfrm>
+          <a:off x="0" y="0"/>
+          <a:ext cx="0" cy="0"/>
+          <a:chOff x="0" y="0"/>
+          <a:chExt cx="0" cy="0"/>
+        </a:xfrm>
+      </p:grpSpPr>
+      <p:sp>
+        <p:nvSpPr>
+          <p:cNvPr id="2" name="Title 1"/>
+          <p:cNvSpPr>
+            <a:spLocks noGrp="1"/>
+          </p:cNvSpPr>
+          <p:nvPr>
+            <p:ph type="title"/>
+          </p:nvPr>
+        </p:nvSpPr>
+        <p:spPr>
+          <a:xfrm>
+            <a:off x="676224" y="2906806"/>
+            <a:ext cx="7583487" cy="1044388"/>
+          </a:xfrm>
+        </p:spPr>
+        <p:txBody>
+          <a:bodyPr anchor="t" anchorCtr="0"/>
+          <a:lstStyle/>
+          <a:p>
+            <a:pPr algn="ctr"/>
+            <a:r>
+              <a:rPr lang="en-US" dirty="0" smtClean="0"/>
+              <a:t>The Vietnam of Computer Science</a:t>
+            </a:r>
+            <a:endParaRPr lang="en-US" dirty="0"/>
+          </a:p>
+        </p:txBody>
+      </p:sp>
+      <p:sp>
+        <p:nvSpPr>
+          <p:cNvPr id="3" name="TextBox 2"/>
+          <p:cNvSpPr txBox="1"/>
+          <p:nvPr/>
+        </p:nvSpPr>
+        <p:spPr>
+          <a:xfrm>
+            <a:off x="2743200" y="4380271"/>
+            <a:ext cx="5147187" cy="923330"/>
+          </a:xfrm>
+          <a:prstGeom prst="rect">
+            <a:avLst/>
+          </a:prstGeom>
+          <a:noFill/>
+        </p:spPr>
+        <p:txBody>
+          <a:bodyPr wrap="square" rtlCol="0">
+            <a:spAutoFit/>
+          </a:bodyPr>
+          <a:lstStyle/>
+          <a:p>
+            <a:r>
+              <a:rPr lang="en-US" dirty="0" smtClean="0">
+                <a:solidFill>
+                  <a:schemeClr val="bg1"/>
+                </a:solidFill>
+              </a:rPr>
+              <a:t>Ted </a:t>
+            </a:r>
+            <a:r>
+              <a:rPr lang="en-US" dirty="0" err="1" smtClean="0">
+                <a:solidFill>
+                  <a:schemeClr val="bg1"/>
+                </a:solidFill>
+              </a:rPr>
+              <a:t>Neward</a:t>
+            </a:r>
+            <a:r>
+              <a:rPr lang="en-US" dirty="0" smtClean="0">
+                <a:solidFill>
+                  <a:schemeClr val="bg1"/>
+                </a:solidFill>
+              </a:rPr>
+              <a:t> – June 26, 2006 (</a:t>
+            </a:r>
+            <a:r>
+              <a:rPr lang="en-US" dirty="0" smtClean="0">
+                <a:solidFill>
+                  <a:schemeClr val="bg1"/>
+                </a:solidFill>
+                <a:hlinkClick r:id="rId2"/>
+              </a:rPr>
+              <a:t>http</a:t>
+            </a:r>
+            <a:r>
+              <a:rPr lang="en-US" dirty="0">
+                <a:solidFill>
+                  <a:schemeClr val="bg1"/>
+                </a:solidFill>
+                <a:hlinkClick r:id="rId2"/>
+              </a:rPr>
+              <a:t>://</a:t>
+            </a:r>
+            <a:r>
+              <a:rPr lang="en-US" dirty="0" smtClean="0">
+                <a:solidFill>
+                  <a:schemeClr val="bg1"/>
+                </a:solidFill>
+                <a:hlinkClick r:id="rId2"/>
+              </a:rPr>
+              <a:t>blogs.tedneward.com/2006/06/26/The+Vietnam+Of+Computer+Science.aspx</a:t>
+            </a:r>
+            <a:r>
+              <a:rPr lang="en-US" dirty="0" smtClean="0">
+                <a:solidFill>
+                  <a:schemeClr val="bg1"/>
+                </a:solidFill>
+              </a:rPr>
+              <a:t>)</a:t>
+            </a:r>
+            <a:endParaRPr lang="en-US" dirty="0">
+              <a:solidFill>
+                <a:schemeClr val="bg1"/>
+              </a:solidFill>
+            </a:endParaRPr>
+          </a:p>
+        </p:txBody>
+      </p:sp>
+    </p:spTree>
+    <p:extLst>
+      <p:ext uri="{BB962C8B-B14F-4D97-AF65-F5344CB8AC3E}">
+        <p14:creationId xmlns:p14="http://schemas.microsoft.com/office/powerpoint/2010/main" val="1287633269"/>
+      </p:ext>
+    </p:extLst>
+  </p:cSld>
+  <p:clrMapOvr>
+    <a:masterClrMapping/>
+  </p:clrMapOvr>
+</p:sld>
+</file>
+
+<file path=ppt/slides/slide5.xml><?xml version="1.0" encoding="utf-8"?>
+<p:sld xmlns:a="http://schemas.openxmlformats.org/drawingml/2006/main" xmlns:r="http://schemas.openxmlformats.org/officeDocument/2006/relationships" xmlns:p="http://schemas.openxmlformats.org/presentationml/2006/main">
+  <p:cSld>
+    <p:spTree>
+      <p:nvGrpSpPr>
+        <p:cNvPr id="1" name=""/>
+        <p:cNvGrpSpPr/>
+        <p:nvPr/>
+      </p:nvGrpSpPr>
+      <p:grpSpPr>
+        <a:xfrm>
+          <a:off x="0" y="0"/>
+          <a:ext cx="0" cy="0"/>
+          <a:chOff x="0" y="0"/>
+          <a:chExt cx="0" cy="0"/>
+        </a:xfrm>
+      </p:grpSpPr>
+      <p:sp>
+        <p:nvSpPr>
+          <p:cNvPr id="2" name="Title 1"/>
+          <p:cNvSpPr>
+            <a:spLocks noGrp="1"/>
+          </p:cNvSpPr>
+          <p:nvPr>
+            <p:ph type="title"/>
+          </p:nvPr>
+        </p:nvSpPr>
+        <p:spPr>
+          <a:xfrm>
+            <a:off x="780256" y="2192882"/>
+            <a:ext cx="7583487" cy="1936665"/>
+          </a:xfrm>
+        </p:spPr>
+        <p:txBody>
+          <a:bodyPr anchor="t" anchorCtr="0"/>
+          <a:lstStyle/>
+          <a:p>
+            <a:pPr algn="ctr"/>
+            <a:r>
+              <a:rPr lang="en-US" dirty="0" smtClean="0"/>
+              <a:t>ORM Hate: </a:t>
+            </a:r>
+            <a:r>
+              <a:rPr lang="en-US" dirty="0"/>
+              <a:t>“Much of the frustration about ORMs is inflated expectations”</a:t>
+            </a:r>
+          </a:p>
+        </p:txBody>
+      </p:sp>
+      <p:sp>
+        <p:nvSpPr>
+          <p:cNvPr id="3" name="TextBox 2"/>
+          <p:cNvSpPr txBox="1"/>
+          <p:nvPr/>
+        </p:nvSpPr>
+        <p:spPr>
+          <a:xfrm>
+            <a:off x="2743200" y="4380271"/>
+            <a:ext cx="5147187" cy="646331"/>
+          </a:xfrm>
+          <a:prstGeom prst="rect">
+            <a:avLst/>
+          </a:prstGeom>
+          <a:noFill/>
+        </p:spPr>
+        <p:txBody>
+          <a:bodyPr wrap="square" rtlCol="0">
+            <a:spAutoFit/>
+          </a:bodyPr>
+          <a:lstStyle/>
+          <a:p>
+            <a:r>
+              <a:rPr lang="en-US" dirty="0" smtClean="0">
+                <a:solidFill>
+                  <a:schemeClr val="bg1"/>
+                </a:solidFill>
+              </a:rPr>
+              <a:t>Martin Fowler – May 8, 2012 (</a:t>
+            </a:r>
+            <a:r>
+              <a:rPr lang="en-US" dirty="0">
+                <a:hlinkClick r:id="rId2"/>
+              </a:rPr>
+              <a:t>http://martinfowler.com/bliki/OrmHate.html</a:t>
+            </a:r>
+            <a:r>
+              <a:rPr lang="en-US" dirty="0" smtClean="0">
+                <a:solidFill>
+                  <a:schemeClr val="bg1"/>
+                </a:solidFill>
+              </a:rPr>
+              <a:t>)</a:t>
+            </a:r>
+            <a:endParaRPr lang="en-US" dirty="0">
+              <a:solidFill>
+                <a:schemeClr val="bg1"/>
+              </a:solidFill>
+            </a:endParaRPr>
+          </a:p>
+        </p:txBody>
+      </p:sp>
+    </p:spTree>
+    <p:extLst>
+      <p:ext uri="{BB962C8B-B14F-4D97-AF65-F5344CB8AC3E}">
+        <p14:creationId xmlns:p14="http://schemas.microsoft.com/office/powerpoint/2010/main" val="3611553155"/>
+      </p:ext>
+    </p:extLst>
+  </p:cSld>
+  <p:clrMapOvr>
+    <a:masterClrMapping/>
+  </p:clrMapOvr>
+</p:sld>
+</file>
+
+<file path=ppt/slides/slide6.xml><?xml version="1.0" encoding="utf-8"?>
+<p:sld xmlns:a="http://schemas.openxmlformats.org/drawingml/2006/main" xmlns:r="http://schemas.openxmlformats.org/officeDocument/2006/relationships" xmlns:p="http://schemas.openxmlformats.org/presentationml/2006/main">
+  <p:cSld>
+    <p:spTree>
+      <p:nvGrpSpPr>
+        <p:cNvPr id="1" name=""/>
+        <p:cNvGrpSpPr/>
+        <p:nvPr/>
+      </p:nvGrpSpPr>
+      <p:grpSpPr>
+        <a:xfrm>
+          <a:off x="0" y="0"/>
+          <a:ext cx="0" cy="0"/>
+          <a:chOff x="0" y="0"/>
+          <a:chExt cx="0" cy="0"/>
+        </a:xfrm>
+      </p:grpSpPr>
+      <p:sp>
+        <p:nvSpPr>
+          <p:cNvPr id="2" name="Title 1"/>
+          <p:cNvSpPr>
+            <a:spLocks noGrp="1"/>
+          </p:cNvSpPr>
+          <p:nvPr>
+            <p:ph type="title"/>
+          </p:nvPr>
+        </p:nvSpPr>
+        <p:spPr>
+          <a:xfrm>
+            <a:off x="676224" y="2906806"/>
+            <a:ext cx="7583487" cy="1044388"/>
+          </a:xfrm>
+        </p:spPr>
+        <p:txBody>
+          <a:bodyPr anchor="t" anchorCtr="0"/>
+          <a:lstStyle/>
+          <a:p>
+            <a:pPr algn="ctr"/>
+            <a:r>
+              <a:rPr lang="en-US" dirty="0" smtClean="0"/>
+              <a:t>Don’t Write You Own ORM</a:t>
+            </a:r>
+            <a:endParaRPr lang="en-US" dirty="0"/>
+          </a:p>
+        </p:txBody>
+      </p:sp>
+      <p:sp>
+        <p:nvSpPr>
+          <p:cNvPr id="3" name="TextBox 2"/>
+          <p:cNvSpPr txBox="1"/>
+          <p:nvPr/>
+        </p:nvSpPr>
+        <p:spPr>
+          <a:xfrm>
+            <a:off x="2743200" y="4380271"/>
+            <a:ext cx="5147187" cy="923330"/>
+          </a:xfrm>
+          <a:prstGeom prst="rect">
+            <a:avLst/>
+          </a:prstGeom>
+          <a:noFill/>
+        </p:spPr>
+        <p:txBody>
+          <a:bodyPr wrap="square" rtlCol="0">
+            <a:spAutoFit/>
+          </a:bodyPr>
+          <a:lstStyle/>
+          <a:p>
+            <a:r>
+              <a:rPr lang="en-US" dirty="0" smtClean="0">
+                <a:solidFill>
+                  <a:schemeClr val="bg1"/>
+                </a:solidFill>
+              </a:rPr>
+              <a:t>Jimmy </a:t>
+            </a:r>
+            <a:r>
+              <a:rPr lang="en-US" dirty="0" err="1" smtClean="0">
+                <a:solidFill>
+                  <a:schemeClr val="bg1"/>
+                </a:solidFill>
+              </a:rPr>
+              <a:t>Bogard</a:t>
+            </a:r>
+            <a:r>
+              <a:rPr lang="en-US" dirty="0" smtClean="0">
+                <a:solidFill>
+                  <a:schemeClr val="bg1"/>
+                </a:solidFill>
+              </a:rPr>
+              <a:t> – July 24, 2012 (</a:t>
+            </a:r>
+            <a:r>
+              <a:rPr lang="en-US" dirty="0">
+                <a:hlinkClick r:id="rId2"/>
+              </a:rPr>
+              <a:t>http://lostechies.com/jimmybogard/2012/07/24/dont-write-your-own-orm/</a:t>
+            </a:r>
+            <a:r>
+              <a:rPr lang="en-US" dirty="0" smtClean="0">
+                <a:solidFill>
+                  <a:schemeClr val="bg1"/>
+                </a:solidFill>
+              </a:rPr>
+              <a:t>)</a:t>
+            </a:r>
+            <a:endParaRPr lang="en-US" dirty="0">
+              <a:solidFill>
+                <a:schemeClr val="bg1"/>
+              </a:solidFill>
+            </a:endParaRPr>
+          </a:p>
+        </p:txBody>
+      </p:sp>
+    </p:spTree>
+    <p:extLst>
+      <p:ext uri="{BB962C8B-B14F-4D97-AF65-F5344CB8AC3E}">
+        <p14:creationId xmlns:p14="http://schemas.microsoft.com/office/powerpoint/2010/main" val="2858560375"/>
+      </p:ext>
+    </p:extLst>
+  </p:cSld>
+  <p:clrMapOvr>
+    <a:masterClrMapping/>
+  </p:clrMapOvr>
+</p:sld>
+</file>
+
+<file path=ppt/slides/slide7.xml><?xml version="1.0" encoding="utf-8"?>
+<p:sld xmlns:a="http://schemas.openxmlformats.org/drawingml/2006/main" xmlns:r="http://schemas.openxmlformats.org/officeDocument/2006/relationships" xmlns:p="http://schemas.openxmlformats.org/presentationml/2006/main">
+  <p:cSld>
+    <p:spTree>
+      <p:nvGrpSpPr>
+        <p:cNvPr id="1" name=""/>
+        <p:cNvGrpSpPr/>
+        <p:nvPr/>
+      </p:nvGrpSpPr>
+      <p:grpSpPr>
+        <a:xfrm>
+          <a:off x="0" y="0"/>
+          <a:ext cx="0" cy="0"/>
+          <a:chOff x="0" y="0"/>
+          <a:chExt cx="0" cy="0"/>
+        </a:xfrm>
+      </p:grpSpPr>
+      <p:sp>
+        <p:nvSpPr>
+          <p:cNvPr id="2" name="Title 1"/>
+          <p:cNvSpPr>
+            <a:spLocks noGrp="1"/>
+          </p:cNvSpPr>
+          <p:nvPr>
+            <p:ph type="title"/>
+          </p:nvPr>
+        </p:nvSpPr>
+        <p:spPr/>
+        <p:txBody>
+          <a:bodyPr/>
+          <a:lstStyle/>
+          <a:p>
+            <a:r>
+              <a:rPr lang="en-US" dirty="0" smtClean="0"/>
+              <a:t>Choices</a:t>
+            </a:r>
+            <a:endParaRPr lang="en-US" dirty="0"/>
+          </a:p>
+        </p:txBody>
+      </p:sp>
+      <p:sp>
+        <p:nvSpPr>
+          <p:cNvPr id="3" name="Content Placeholder 2"/>
+          <p:cNvSpPr>
+            <a:spLocks noGrp="1"/>
+          </p:cNvSpPr>
+          <p:nvPr>
+            <p:ph idx="1"/>
+          </p:nvPr>
+        </p:nvSpPr>
+        <p:spPr/>
+        <p:txBody>
+          <a:bodyPr/>
+          <a:lstStyle/>
+          <a:p>
+            <a:r>
+              <a:rPr lang="en-US" strike="sngStrike" dirty="0" smtClean="0"/>
+              <a:t>Write your own data access layer</a:t>
+            </a:r>
+          </a:p>
+          <a:p>
+            <a:r>
+              <a:rPr lang="en-US" dirty="0" smtClean="0"/>
+              <a:t>Use a full-blown ORM</a:t>
+            </a:r>
+          </a:p>
+          <a:p>
+            <a:pPr lvl="1"/>
+            <a:r>
+              <a:rPr lang="en-US" dirty="0" err="1" smtClean="0"/>
+              <a:t>NHibernate</a:t>
+            </a:r>
+            <a:endParaRPr lang="en-US" dirty="0" smtClean="0"/>
+          </a:p>
+          <a:p>
+            <a:pPr lvl="1"/>
+            <a:r>
+              <a:rPr lang="en-US" strike="sngStrike" dirty="0" smtClean="0"/>
+              <a:t>Entity Framework</a:t>
+            </a:r>
+          </a:p>
+          <a:p>
+            <a:pPr lvl="1"/>
+            <a:r>
+              <a:rPr lang="en-US" dirty="0" err="1" smtClean="0"/>
+              <a:t>ActiveRecord</a:t>
+            </a:r>
+            <a:r>
+              <a:rPr lang="en-US" dirty="0" smtClean="0"/>
+              <a:t> (</a:t>
+            </a:r>
+            <a:r>
+              <a:rPr lang="en-US" dirty="0" err="1" smtClean="0"/>
+              <a:t>sorta</a:t>
+            </a:r>
+            <a:r>
+              <a:rPr lang="en-US" dirty="0" smtClean="0"/>
+              <a:t>…)</a:t>
+            </a:r>
+          </a:p>
+          <a:p>
+            <a:r>
+              <a:rPr lang="en-US" dirty="0" smtClean="0"/>
+              <a:t>Use a </a:t>
+            </a:r>
+            <a:r>
+              <a:rPr lang="en-US" dirty="0" err="1" smtClean="0"/>
+              <a:t>MicroORM</a:t>
+            </a:r>
+            <a:endParaRPr lang="en-US" dirty="0" smtClean="0"/>
+          </a:p>
+          <a:p>
+            <a:pPr lvl="1"/>
+            <a:r>
+              <a:rPr lang="en-US" dirty="0" smtClean="0"/>
+              <a:t>Massive</a:t>
+            </a:r>
+          </a:p>
+          <a:p>
+            <a:pPr lvl="1"/>
+            <a:r>
+              <a:rPr lang="en-US" dirty="0" smtClean="0"/>
+              <a:t>Dapper</a:t>
+            </a:r>
+          </a:p>
+          <a:p>
+            <a:pPr lvl="1"/>
+            <a:r>
+              <a:rPr lang="en-US" dirty="0" err="1" smtClean="0"/>
+              <a:t>PetaPoco</a:t>
+            </a:r>
+            <a:endParaRPr lang="en-US" dirty="0"/>
+          </a:p>
+        </p:txBody>
+      </p:sp>
+    </p:spTree>
+    <p:extLst>
+      <p:ext uri="{BB962C8B-B14F-4D97-AF65-F5344CB8AC3E}">
+        <p14:creationId xmlns:p14="http://schemas.microsoft.com/office/powerpoint/2010/main" val="418519510"/>
+      </p:ext>
+    </p:extLst>
+  </p:cSld>
+  <p:clrMapOvr>
+    <a:masterClrMapping/>
+  </p:clrMapOvr>
+</p:sld>
+</file>
+
+<file path=ppt/slides/slide8.xml><?xml version="1.0" encoding="utf-8"?>
+<p:sld xmlns:a="http://schemas.openxmlformats.org/drawingml/2006/main" xmlns:r="http://schemas.openxmlformats.org/officeDocument/2006/relationships" xmlns:p="http://schemas.openxmlformats.org/presentationml/2006/main">
+  <p:cSld>
+    <p:spTree>
+      <p:nvGrpSpPr>
+        <p:cNvPr id="1" name=""/>
+        <p:cNvGrpSpPr/>
+        <p:nvPr/>
+      </p:nvGrpSpPr>
+      <p:grpSpPr>
+        <a:xfrm>
+          <a:off x="0" y="0"/>
+          <a:ext cx="0" cy="0"/>
+          <a:chOff x="0" y="0"/>
+          <a:chExt cx="0" cy="0"/>
+        </a:xfrm>
+      </p:grpSpPr>
+      <p:sp>
+        <p:nvSpPr>
+          <p:cNvPr id="2" name="Title 1"/>
+          <p:cNvSpPr>
+            <a:spLocks noGrp="1"/>
+          </p:cNvSpPr>
+          <p:nvPr>
+            <p:ph type="title"/>
+          </p:nvPr>
+        </p:nvSpPr>
+        <p:spPr/>
+        <p:txBody>
+          <a:bodyPr/>
+          <a:lstStyle/>
+          <a:p>
+            <a:r>
+              <a:rPr lang="en-US" dirty="0" smtClean="0"/>
+              <a:t>What is a </a:t>
+            </a:r>
+            <a:r>
+              <a:rPr lang="en-US" dirty="0" err="1" smtClean="0"/>
+              <a:t>MicroORM</a:t>
+            </a:r>
+            <a:endParaRPr lang="en-US" dirty="0"/>
+          </a:p>
+        </p:txBody>
+      </p:sp>
+      <p:sp>
+        <p:nvSpPr>
+          <p:cNvPr id="3" name="Content Placeholder 2"/>
+          <p:cNvSpPr>
+            <a:spLocks noGrp="1"/>
+          </p:cNvSpPr>
+          <p:nvPr>
+            <p:ph idx="1"/>
+          </p:nvPr>
+        </p:nvSpPr>
+        <p:spPr/>
+        <p:txBody>
+          <a:bodyPr/>
+          <a:lstStyle/>
+          <a:p>
+            <a:r>
+              <a:rPr lang="en-US" dirty="0" err="1" smtClean="0"/>
+              <a:t>MicroORM</a:t>
+            </a:r>
+            <a:r>
+              <a:rPr lang="en-US" dirty="0" smtClean="0"/>
+              <a:t> is a misnomer</a:t>
+            </a:r>
+          </a:p>
+        </p:txBody>
+      </p:sp>
+    </p:spTree>
+    <p:extLst>
+      <p:ext uri="{BB962C8B-B14F-4D97-AF65-F5344CB8AC3E}">
+        <p14:creationId xmlns:p14="http://schemas.microsoft.com/office/powerpoint/2010/main" val="718928870"/>
+      </p:ext>
+    </p:extLst>
+  </p:cSld>
+  <p:clrMapOvr>
+    <a:masterClrMapping/>
+  </p:clrMapOvr>
+</p:sld>
+</file>
+
+<file path=ppt/slides/slide9.xml><?xml version="1.0" encoding="utf-8"?>
+<p:sld xmlns:a="http://schemas.openxmlformats.org/drawingml/2006/main" xmlns:r="http://schemas.openxmlformats.org/officeDocument/2006/relationships" xmlns:p="http://schemas.openxmlformats.org/presentationml/2006/main">
+  <p:cSld>
+    <p:spTree>
+      <p:nvGrpSpPr>
+        <p:cNvPr id="1" name=""/>
+        <p:cNvGrpSpPr/>
+        <p:nvPr/>
+      </p:nvGrpSpPr>
+      <p:grpSpPr>
+        <a:xfrm>
+          <a:off x="0" y="0"/>
+          <a:ext cx="0" cy="0"/>
+          <a:chOff x="0" y="0"/>
+          <a:chExt cx="0" cy="0"/>
+        </a:xfrm>
+      </p:grpSpPr>
+      <p:sp>
+        <p:nvSpPr>
+          <p:cNvPr id="2" name="Title 1"/>
+          <p:cNvSpPr>
+            <a:spLocks noGrp="1"/>
+          </p:cNvSpPr>
+          <p:nvPr>
+            <p:ph type="title"/>
+          </p:nvPr>
+        </p:nvSpPr>
+        <p:spPr/>
+        <p:txBody>
+          <a:bodyPr/>
+          <a:lstStyle/>
+          <a:p>
+            <a:r>
+              <a:rPr lang="en-US" dirty="0" err="1" smtClean="0"/>
+              <a:t>PetaPoco</a:t>
+            </a:r>
+            <a:endParaRPr lang="en-US" dirty="0"/>
+          </a:p>
+        </p:txBody>
+      </p:sp>
+      <p:sp>
+        <p:nvSpPr>
+          <p:cNvPr id="3" name="Content Placeholder 2"/>
+          <p:cNvSpPr>
+            <a:spLocks noGrp="1"/>
+          </p:cNvSpPr>
+          <p:nvPr>
+            <p:ph idx="1"/>
+          </p:nvPr>
+        </p:nvSpPr>
+        <p:spPr>
+          <a:xfrm>
+            <a:off x="779463" y="3067664"/>
+            <a:ext cx="7583487" cy="722671"/>
+          </a:xfrm>
+        </p:spPr>
+        <p:txBody>
+          <a:bodyPr/>
+          <a:lstStyle/>
+          <a:p>
+            <a:pPr marL="0" indent="0" algn="ctr">
+              <a:buNone/>
+            </a:pPr>
+            <a:r>
+              <a:rPr lang="en-US" sz="2800" dirty="0" smtClean="0"/>
+              <a:t>DEMO – What does it get me?</a:t>
+            </a:r>
+            <a:endParaRPr lang="en-US" sz="2800" dirty="0"/>
+          </a:p>
+        </p:txBody>
+      </p:sp>
+    </p:spTree>
+    <p:extLst>
+      <p:ext uri="{BB962C8B-B14F-4D97-AF65-F5344CB8AC3E}">
+        <p14:creationId xmlns:p14="http://schemas.microsoft.com/office/powerpoint/2010/main" val="2789506589"/>
       </p:ext>
     </p:extLst>
   </p:cSld>

</xml_diff>